<commit_message>
updated edison overview presentation.
</commit_message>
<xml_diff>
--- a/docs/tutorials/overview.pptx
+++ b/docs/tutorials/overview.pptx
@@ -4034,15 +4034,15 @@
             <a:pPr lvl="1"/>
             <a:r>
               <a:rPr lang="en-US" dirty="0" err="1" smtClean="0"/>
+              <a:t>cloudDirectory</a:t>
+            </a:r>
+            <a:endParaRPr lang="en-US" dirty="0" smtClean="0"/>
+          </a:p>
+          <a:p>
+            <a:pPr lvl="1"/>
+            <a:r>
+              <a:rPr lang="en-US" dirty="0" err="1" smtClean="0"/>
               <a:t>localComm</a:t>
-            </a:r>
-            <a:endParaRPr lang="en-US" dirty="0" smtClean="0"/>
-          </a:p>
-          <a:p>
-            <a:pPr lvl="1"/>
-            <a:r>
-              <a:rPr lang="en-US" dirty="0" err="1" smtClean="0"/>
-              <a:t>cloudDirectory</a:t>
             </a:r>
             <a:endParaRPr lang="en-US" dirty="0" smtClean="0"/>
           </a:p>

</xml_diff>

<commit_message>
added the pubsub interface specification to presentation for clarity.
</commit_message>
<xml_diff>
--- a/docs/tutorials/overview.pptx
+++ b/docs/tutorials/overview.pptx
@@ -204,7 +204,7 @@
           <a:p>
             <a:fld id="{7DFD0073-33D8-B84F-916B-09F76D5EE8AA}" type="datetimeFigureOut">
               <a:rPr lang="en-US" smtClean="0"/>
-              <a:t>3/28/14</a:t>
+              <a:t>3/31/14</a:t>
             </a:fld>
             <a:endParaRPr lang="en-US"/>
           </a:p>
@@ -737,7 +737,7 @@
           <a:p>
             <a:fld id="{4D99775E-6597-244C-A3B1-EE888261407C}" type="datetimeFigureOut">
               <a:rPr lang="en-US" smtClean="0"/>
-              <a:t>3/28/14</a:t>
+              <a:t>3/31/14</a:t>
             </a:fld>
             <a:endParaRPr lang="en-US"/>
           </a:p>
@@ -907,7 +907,7 @@
           <a:p>
             <a:fld id="{4D99775E-6597-244C-A3B1-EE888261407C}" type="datetimeFigureOut">
               <a:rPr lang="en-US" smtClean="0"/>
-              <a:t>3/28/14</a:t>
+              <a:t>3/31/14</a:t>
             </a:fld>
             <a:endParaRPr lang="en-US"/>
           </a:p>
@@ -1087,7 +1087,7 @@
           <a:p>
             <a:fld id="{4D99775E-6597-244C-A3B1-EE888261407C}" type="datetimeFigureOut">
               <a:rPr lang="en-US" smtClean="0"/>
-              <a:t>3/28/14</a:t>
+              <a:t>3/31/14</a:t>
             </a:fld>
             <a:endParaRPr lang="en-US"/>
           </a:p>
@@ -1257,7 +1257,7 @@
           <a:p>
             <a:fld id="{4D99775E-6597-244C-A3B1-EE888261407C}" type="datetimeFigureOut">
               <a:rPr lang="en-US" smtClean="0"/>
-              <a:t>3/28/14</a:t>
+              <a:t>3/31/14</a:t>
             </a:fld>
             <a:endParaRPr lang="en-US"/>
           </a:p>
@@ -1503,7 +1503,7 @@
           <a:p>
             <a:fld id="{4D99775E-6597-244C-A3B1-EE888261407C}" type="datetimeFigureOut">
               <a:rPr lang="en-US" smtClean="0"/>
-              <a:t>3/28/14</a:t>
+              <a:t>3/31/14</a:t>
             </a:fld>
             <a:endParaRPr lang="en-US"/>
           </a:p>
@@ -1791,7 +1791,7 @@
           <a:p>
             <a:fld id="{4D99775E-6597-244C-A3B1-EE888261407C}" type="datetimeFigureOut">
               <a:rPr lang="en-US" smtClean="0"/>
-              <a:t>3/28/14</a:t>
+              <a:t>3/31/14</a:t>
             </a:fld>
             <a:endParaRPr lang="en-US"/>
           </a:p>
@@ -2213,7 +2213,7 @@
           <a:p>
             <a:fld id="{4D99775E-6597-244C-A3B1-EE888261407C}" type="datetimeFigureOut">
               <a:rPr lang="en-US" smtClean="0"/>
-              <a:t>3/28/14</a:t>
+              <a:t>3/31/14</a:t>
             </a:fld>
             <a:endParaRPr lang="en-US"/>
           </a:p>
@@ -2331,7 +2331,7 @@
           <a:p>
             <a:fld id="{4D99775E-6597-244C-A3B1-EE888261407C}" type="datetimeFigureOut">
               <a:rPr lang="en-US" smtClean="0"/>
-              <a:t>3/28/14</a:t>
+              <a:t>3/31/14</a:t>
             </a:fld>
             <a:endParaRPr lang="en-US"/>
           </a:p>
@@ -2426,7 +2426,7 @@
           <a:p>
             <a:fld id="{4D99775E-6597-244C-A3B1-EE888261407C}" type="datetimeFigureOut">
               <a:rPr lang="en-US" smtClean="0"/>
-              <a:t>3/28/14</a:t>
+              <a:t>3/31/14</a:t>
             </a:fld>
             <a:endParaRPr lang="en-US"/>
           </a:p>
@@ -2703,7 +2703,7 @@
           <a:p>
             <a:fld id="{4D99775E-6597-244C-A3B1-EE888261407C}" type="datetimeFigureOut">
               <a:rPr lang="en-US" smtClean="0"/>
-              <a:t>3/28/14</a:t>
+              <a:t>3/31/14</a:t>
             </a:fld>
             <a:endParaRPr lang="en-US"/>
           </a:p>
@@ -2956,7 +2956,7 @@
           <a:p>
             <a:fld id="{4D99775E-6597-244C-A3B1-EE888261407C}" type="datetimeFigureOut">
               <a:rPr lang="en-US" smtClean="0"/>
-              <a:t>3/28/14</a:t>
+              <a:t>3/31/14</a:t>
             </a:fld>
             <a:endParaRPr lang="en-US"/>
           </a:p>
@@ -3169,7 +3169,7 @@
           <a:p>
             <a:fld id="{4D99775E-6597-244C-A3B1-EE888261407C}" type="datetimeFigureOut">
               <a:rPr lang="en-US" smtClean="0"/>
-              <a:t>3/28/14</a:t>
+              <a:t>3/31/14</a:t>
             </a:fld>
             <a:endParaRPr lang="en-US"/>
           </a:p>
@@ -3561,7 +3561,11 @@
           <a:p>
             <a:r>
               <a:rPr lang="en-US" dirty="0" smtClean="0"/>
-              <a:t>The Edison API</a:t>
+              <a:t>The Edison </a:t>
+            </a:r>
+            <a:r>
+              <a:rPr lang="en-US" dirty="0" smtClean="0"/>
+              <a:t>Convenience Library</a:t>
             </a:r>
             <a:endParaRPr lang="en-US" dirty="0"/>
           </a:p>
@@ -3584,7 +3588,15 @@
           <a:p>
             <a:r>
               <a:rPr lang="en-US" dirty="0" smtClean="0"/>
-              <a:t>Yes, I said “API”</a:t>
+              <a:t>Fine, I’ll stop </a:t>
+            </a:r>
+            <a:r>
+              <a:rPr lang="en-US" dirty="0" smtClean="0"/>
+              <a:t>calling it an </a:t>
+            </a:r>
+            <a:r>
+              <a:rPr lang="en-US" dirty="0" smtClean="0"/>
+              <a:t>“API”</a:t>
             </a:r>
             <a:endParaRPr lang="en-US" dirty="0"/>
           </a:p>
@@ -4680,7 +4692,6 @@
               <a:rPr lang="en-US" dirty="0" smtClean="0"/>
               <a:t>)</a:t>
             </a:r>
-            <a:endParaRPr lang="en-US" dirty="0" smtClean="0"/>
           </a:p>
           <a:p>
             <a:pPr lvl="1"/>
@@ -4971,7 +4982,7 @@
         </p:nvSpPr>
         <p:spPr>
           <a:xfrm>
-            <a:off x="457200" y="2828836"/>
+            <a:off x="457200" y="2560412"/>
             <a:ext cx="8229600" cy="738664"/>
           </a:xfrm>
           <a:prstGeom prst="rect">
@@ -5062,7 +5073,7 @@
         </p:nvSpPr>
         <p:spPr>
           <a:xfrm>
-            <a:off x="457200" y="1930667"/>
+            <a:off x="457200" y="1662243"/>
             <a:ext cx="6384343" cy="923330"/>
           </a:xfrm>
           <a:prstGeom prst="rect">
@@ -5100,6 +5111,133 @@
             <a:r>
               <a:rPr lang="en-US" dirty="0" err="1" smtClean="0"/>
               <a:t>localDirectory-basic.json</a:t>
+            </a:r>
+            <a:r>
+              <a:rPr lang="en-US" dirty="0" smtClean="0"/>
+              <a:t>”:</a:t>
+            </a:r>
+            <a:endParaRPr lang="en-US" dirty="0"/>
+          </a:p>
+        </p:txBody>
+      </p:sp>
+      <p:sp>
+        <p:nvSpPr>
+          <p:cNvPr id="3" name="Rectangle 2"/>
+          <p:cNvSpPr/>
+          <p:nvPr/>
+        </p:nvSpPr>
+        <p:spPr>
+          <a:xfrm>
+            <a:off x="561740" y="5069237"/>
+            <a:ext cx="8125060" cy="738664"/>
+          </a:xfrm>
+          <a:prstGeom prst="rect">
+            <a:avLst/>
+          </a:prstGeom>
+        </p:spPr>
+        <p:txBody>
+          <a:bodyPr wrap="square">
+            <a:spAutoFit/>
+          </a:bodyPr>
+          <a:lstStyle/>
+          <a:p>
+            <a:r>
+              <a:rPr lang="en-US" sz="1400" dirty="0">
+                <a:latin typeface="Courier"/>
+                <a:cs typeface="Courier"/>
+              </a:rPr>
+              <a:t>{</a:t>
+            </a:r>
+          </a:p>
+          <a:p>
+            <a:r>
+              <a:rPr lang="en-US" sz="1400" dirty="0">
+                <a:latin typeface="Courier"/>
+                <a:cs typeface="Courier"/>
+              </a:rPr>
+              <a:t>	"functions": ["</a:t>
+            </a:r>
+            <a:r>
+              <a:rPr lang="en-US" sz="1400" dirty="0" err="1">
+                <a:latin typeface="Courier"/>
+                <a:cs typeface="Courier"/>
+              </a:rPr>
+              <a:t>createClient</a:t>
+            </a:r>
+            <a:r>
+              <a:rPr lang="en-US" sz="1400" dirty="0">
+                <a:latin typeface="Courier"/>
+                <a:cs typeface="Courier"/>
+              </a:rPr>
+              <a:t>", "publish", "subscribe", "close"]</a:t>
+            </a:r>
+          </a:p>
+          <a:p>
+            <a:r>
+              <a:rPr lang="en-US" sz="1400" dirty="0">
+                <a:latin typeface="Courier"/>
+                <a:cs typeface="Courier"/>
+              </a:rPr>
+              <a:t>}</a:t>
+            </a:r>
+            <a:endParaRPr lang="en-US" sz="1400" dirty="0">
+              <a:latin typeface="Courier"/>
+              <a:cs typeface="Courier"/>
+            </a:endParaRPr>
+          </a:p>
+        </p:txBody>
+      </p:sp>
+      <p:sp>
+        <p:nvSpPr>
+          <p:cNvPr id="6" name="TextBox 5"/>
+          <p:cNvSpPr txBox="1"/>
+          <p:nvPr/>
+        </p:nvSpPr>
+        <p:spPr>
+          <a:xfrm>
+            <a:off x="457200" y="4178880"/>
+            <a:ext cx="4176556" cy="923330"/>
+          </a:xfrm>
+          <a:prstGeom prst="rect">
+            <a:avLst/>
+          </a:prstGeom>
+          <a:noFill/>
+        </p:spPr>
+        <p:txBody>
+          <a:bodyPr wrap="none" rtlCol="0">
+            <a:spAutoFit/>
+          </a:bodyPr>
+          <a:lstStyle/>
+          <a:p>
+            <a:r>
+              <a:rPr lang="en-US" dirty="0" smtClean="0"/>
+              <a:t>Component: </a:t>
+            </a:r>
+            <a:r>
+              <a:rPr lang="en-US" dirty="0" err="1" smtClean="0"/>
+              <a:t>localComm</a:t>
+            </a:r>
+            <a:endParaRPr lang="en-US" dirty="0" smtClean="0"/>
+          </a:p>
+          <a:p>
+            <a:r>
+              <a:rPr lang="en-US" dirty="0" smtClean="0"/>
+              <a:t>Type: </a:t>
+            </a:r>
+            <a:r>
+              <a:rPr lang="en-US" dirty="0" err="1" smtClean="0"/>
+              <a:t>pubsub</a:t>
+            </a:r>
+            <a:endParaRPr lang="en-US" dirty="0" smtClean="0"/>
+          </a:p>
+          <a:p>
+            <a:r>
+              <a:rPr lang="en-US" dirty="0" smtClean="0"/>
+              <a:t>Specification in “</a:t>
+            </a:r>
+            <a:r>
+              <a:rPr lang="en-US" dirty="0" err="1" smtClean="0"/>
+              <a:t>localComm-pubsub.json</a:t>
             </a:r>
             <a:r>
               <a:rPr lang="en-US" dirty="0" smtClean="0"/>

</xml_diff>